<commit_message>
Found optimal parameters for SVM and neural net. Debugged news article stuff.
</commit_message>
<xml_diff>
--- a/Cloutier Presentation.pptx
+++ b/Cloutier Presentation.pptx
@@ -3626,9 +3626,9 @@
         <p:grpSpPr>
           <a:xfrm>
             <a:off x="-1" y="2535555"/>
-            <a:ext cx="5183188" cy="3130517"/>
+            <a:ext cx="4426227" cy="3785732"/>
             <a:chOff x="813724" y="2386023"/>
-            <a:chExt cx="5183188" cy="3130517"/>
+            <a:chExt cx="4426227" cy="3785732"/>
           </a:xfrm>
         </p:grpSpPr>
         <p:sp>
@@ -3901,7 +3901,7 @@
           <p:spPr>
             <a:xfrm>
               <a:off x="813724" y="2962285"/>
-              <a:ext cx="5183188" cy="2554255"/>
+              <a:ext cx="4426227" cy="3209470"/>
             </a:xfrm>
             <a:prstGeom prst="rect">
               <a:avLst/>
@@ -4204,8 +4204,8 @@
         </p:nvGrpSpPr>
         <p:grpSpPr>
           <a:xfrm>
-            <a:off x="8362042" y="991966"/>
-            <a:ext cx="3829957" cy="2251000"/>
+            <a:off x="8039100" y="991966"/>
+            <a:ext cx="4152899" cy="2251000"/>
             <a:chOff x="5436261" y="3737745"/>
             <a:chExt cx="3646339" cy="2251000"/>
           </a:xfrm>
@@ -4462,7 +4462,7 @@
             </a:lstStyle>
             <a:p>
               <a:r>
-                <a:rPr lang="en-US" smtClean="0"/>
+                <a:rPr lang="en-US" dirty="0" smtClean="0"/>
                 <a:t>Results</a:t>
               </a:r>
               <a:endParaRPr lang="en-US" dirty="0"/>
@@ -4723,23 +4723,7 @@
               </a:pPr>
               <a:r>
                 <a:rPr lang="en-US" sz="1700" dirty="0" smtClean="0"/>
-                <a:t>Daily SVM: </a:t>
-              </a:r>
-              <a:r>
-                <a:rPr lang="en-US" sz="1700" b="1" i="1" u="sng" dirty="0" smtClean="0"/>
-                <a:t>XX</a:t>
-              </a:r>
-              <a:r>
-                <a:rPr lang="en-US" sz="1700" dirty="0" smtClean="0"/>
-                <a:t>%, </a:t>
-              </a:r>
-              <a:r>
-                <a:rPr lang="en-US" sz="1700" b="1" i="1" u="sng" dirty="0" smtClean="0"/>
-                <a:t>YY</a:t>
-              </a:r>
-              <a:r>
-                <a:rPr lang="en-US" sz="1700" dirty="0" smtClean="0"/>
-                <a:t>%</a:t>
+                <a:t>Daily SVM: 50.45%, 54.94%</a:t>
               </a:r>
             </a:p>
             <a:p>
@@ -4756,29 +4740,8 @@
               </a:r>
               <a:r>
                 <a:rPr lang="en-US" sz="1700" dirty="0" smtClean="0"/>
-                <a:t>: </a:t>
+                <a:t>: 50.03%, 55.02%</a:t>
               </a:r>
-              <a:r>
-                <a:rPr lang="en-US" sz="1700" b="1" i="1" u="sng" dirty="0"/>
-                <a:t>XX</a:t>
-              </a:r>
-              <a:r>
-                <a:rPr lang="en-US" sz="1700" dirty="0" smtClean="0"/>
-                <a:t>%</a:t>
-              </a:r>
-              <a:r>
-                <a:rPr lang="en-US" sz="1700" dirty="0"/>
-                <a:t>, </a:t>
-              </a:r>
-              <a:r>
-                <a:rPr lang="en-US" sz="1700" b="1" i="1" u="sng" dirty="0"/>
-                <a:t>YY</a:t>
-              </a:r>
-              <a:r>
-                <a:rPr lang="en-US" sz="1700" dirty="0"/>
-                <a:t>%</a:t>
-              </a:r>
-              <a:endParaRPr lang="en-US" sz="1700" dirty="0" smtClean="0"/>
             </a:p>
             <a:p>
               <a:pPr>
@@ -4786,27 +4749,11 @@
               </a:pPr>
               <a:r>
                 <a:rPr lang="en-US" sz="1700" dirty="0" smtClean="0"/>
-                <a:t>Daily SVM w/ news: </a:t>
+                <a:t>Daily SVM w/ news</a:t>
               </a:r>
               <a:r>
-                <a:rPr lang="en-US" sz="1700" b="1" i="1" u="sng" dirty="0"/>
-                <a:t>XX</a:t>
-              </a:r>
-              <a:r>
-                <a:rPr lang="en-US" sz="1700" dirty="0" smtClean="0"/>
-                <a:t>%</a:t>
-              </a:r>
-              <a:r>
-                <a:rPr lang="en-US" sz="1700" dirty="0"/>
-                <a:t>, </a:t>
-              </a:r>
-              <a:r>
-                <a:rPr lang="en-US" sz="1700" b="1" i="1" u="sng" dirty="0"/>
-                <a:t>YY</a:t>
-              </a:r>
-              <a:r>
-                <a:rPr lang="en-US" sz="1700" dirty="0"/>
-                <a:t>%</a:t>
+                <a:rPr lang="en-US" sz="1700" smtClean="0"/>
+                <a:t>: 52.12%, 53.16%</a:t>
               </a:r>
               <a:endParaRPr lang="en-US" sz="1700" dirty="0" smtClean="0"/>
             </a:p>
@@ -4824,29 +4771,8 @@
               </a:r>
               <a:r>
                 <a:rPr lang="en-US" sz="1700" dirty="0" smtClean="0"/>
-                <a:t> w/ news: </a:t>
+                <a:t> w/ news: 51.13%, 57.73%</a:t>
               </a:r>
-              <a:r>
-                <a:rPr lang="en-US" sz="1700" b="1" i="1" u="sng" dirty="0"/>
-                <a:t>XX</a:t>
-              </a:r>
-              <a:r>
-                <a:rPr lang="en-US" sz="1700" dirty="0" smtClean="0"/>
-                <a:t>%</a:t>
-              </a:r>
-              <a:r>
-                <a:rPr lang="en-US" sz="1700" dirty="0"/>
-                <a:t>, </a:t>
-              </a:r>
-              <a:r>
-                <a:rPr lang="en-US" sz="1700" b="1" i="1" u="sng" dirty="0"/>
-                <a:t>YY</a:t>
-              </a:r>
-              <a:r>
-                <a:rPr lang="en-US" sz="1700" dirty="0"/>
-                <a:t>%</a:t>
-              </a:r>
-              <a:endParaRPr lang="en-US" sz="1700" dirty="0" smtClean="0"/>
             </a:p>
             <a:p>
               <a:pPr lvl="1">
@@ -5406,7 +5332,7 @@
               </a:r>
               <a:r>
                 <a:rPr lang="en-US" dirty="0" err="1" smtClean="0"/>
-                <a:t>func</a:t>
+                <a:t>Func</a:t>
               </a:r>
               <a:r>
                 <a:rPr lang="en-US" dirty="0" smtClean="0"/>
@@ -6019,6 +5945,132 @@
           </p:txBody>
         </p:sp>
       </p:grpSp>
+      <p:pic>
+        <p:nvPicPr>
+          <p:cNvPr id="1026" name="Picture 2"/>
+          <p:cNvPicPr>
+            <a:picLocks noChangeAspect="1" noChangeArrowheads="1"/>
+          </p:cNvPicPr>
+          <p:nvPr/>
+        </p:nvPicPr>
+        <p:blipFill rotWithShape="1">
+          <a:blip r:embed="rId2">
+            <a:extLst>
+              <a:ext uri="{28A0092B-C50C-407E-A947-70E740481C1C}">
+                <a14:useLocalDpi xmlns:a14="http://schemas.microsoft.com/office/drawing/2010/main" val="0"/>
+              </a:ext>
+            </a:extLst>
+          </a:blip>
+          <a:srcRect t="5099"/>
+          <a:stretch/>
+        </p:blipFill>
+        <p:spPr bwMode="auto">
+          <a:xfrm>
+            <a:off x="4412894" y="3839416"/>
+            <a:ext cx="3949148" cy="3018584"/>
+          </a:xfrm>
+          <a:prstGeom prst="rect">
+            <a:avLst/>
+          </a:prstGeom>
+          <a:noFill/>
+          <a:ln>
+            <a:noFill/>
+          </a:ln>
+          <a:effectLst/>
+          <a:extLst>
+            <a:ext uri="{909E8E84-426E-40DD-AFC4-6F175D3DCCD1}">
+              <a14:hiddenFill xmlns:a14="http://schemas.microsoft.com/office/drawing/2010/main">
+                <a:solidFill>
+                  <a:schemeClr val="accent1"/>
+                </a:solidFill>
+              </a14:hiddenFill>
+            </a:ext>
+            <a:ext uri="{91240B29-F687-4F45-9708-019B960494DF}">
+              <a14:hiddenLine xmlns:a14="http://schemas.microsoft.com/office/drawing/2010/main" w="9525">
+                <a:solidFill>
+                  <a:schemeClr val="tx1"/>
+                </a:solidFill>
+                <a:miter lim="800000"/>
+                <a:headEnd/>
+                <a:tailEnd/>
+              </a14:hiddenLine>
+            </a:ext>
+            <a:ext uri="{AF507438-7753-43E0-B8FC-AC1667EBCBE1}">
+              <a14:hiddenEffects xmlns:a14="http://schemas.microsoft.com/office/drawing/2010/main">
+                <a:effectLst>
+                  <a:outerShdw dist="35921" dir="2700000" algn="ctr" rotWithShape="0">
+                    <a:schemeClr val="bg2"/>
+                  </a:outerShdw>
+                </a:effectLst>
+              </a14:hiddenEffects>
+            </a:ext>
+          </a:extLst>
+        </p:spPr>
+      </p:pic>
+      <p:pic>
+        <p:nvPicPr>
+          <p:cNvPr id="1027" name="Picture 3"/>
+          <p:cNvPicPr>
+            <a:picLocks noChangeAspect="1" noChangeArrowheads="1"/>
+          </p:cNvPicPr>
+          <p:nvPr/>
+        </p:nvPicPr>
+        <p:blipFill>
+          <a:blip r:embed="rId3">
+            <a:extLst>
+              <a:ext uri="{28A0092B-C50C-407E-A947-70E740481C1C}">
+                <a14:useLocalDpi xmlns:a14="http://schemas.microsoft.com/office/drawing/2010/main" val="0"/>
+              </a:ext>
+            </a:extLst>
+          </a:blip>
+          <a:srcRect/>
+          <a:stretch>
+            <a:fillRect/>
+          </a:stretch>
+        </p:blipFill>
+        <p:spPr bwMode="auto">
+          <a:xfrm>
+            <a:off x="8358369" y="3839417"/>
+            <a:ext cx="3809617" cy="3018583"/>
+          </a:xfrm>
+          <a:prstGeom prst="rect">
+            <a:avLst/>
+          </a:prstGeom>
+          <a:noFill/>
+          <a:ln>
+            <a:noFill/>
+          </a:ln>
+          <a:effectLst/>
+          <a:extLst>
+            <a:ext uri="{909E8E84-426E-40DD-AFC4-6F175D3DCCD1}">
+              <a14:hiddenFill xmlns:a14="http://schemas.microsoft.com/office/drawing/2010/main">
+                <a:solidFill>
+                  <a:schemeClr val="accent1"/>
+                </a:solidFill>
+              </a14:hiddenFill>
+            </a:ext>
+            <a:ext uri="{91240B29-F687-4F45-9708-019B960494DF}">
+              <a14:hiddenLine xmlns:a14="http://schemas.microsoft.com/office/drawing/2010/main" w="9525">
+                <a:solidFill>
+                  <a:schemeClr val="tx1"/>
+                </a:solidFill>
+                <a:miter lim="800000"/>
+                <a:headEnd/>
+                <a:tailEnd/>
+              </a14:hiddenLine>
+            </a:ext>
+            <a:ext uri="{AF507438-7753-43E0-B8FC-AC1667EBCBE1}">
+              <a14:hiddenEffects xmlns:a14="http://schemas.microsoft.com/office/drawing/2010/main">
+                <a:effectLst>
+                  <a:outerShdw dist="35921" dir="2700000" algn="ctr" rotWithShape="0">
+                    <a:schemeClr val="bg2"/>
+                  </a:outerShdw>
+                </a:effectLst>
+              </a14:hiddenEffects>
+            </a:ext>
+          </a:extLst>
+        </p:spPr>
+      </p:pic>
     </p:spTree>
     <p:extLst>
       <p:ext uri="{BB962C8B-B14F-4D97-AF65-F5344CB8AC3E}">

</xml_diff>